<commit_message>
added stuff to ppt
</commit_message>
<xml_diff>
--- a/project_ppt_lsd53_jdr289.pptx
+++ b/project_ppt_lsd53_jdr289.pptx
@@ -3727,7 +3727,39 @@
           <a:bodyPr/>
           <a:lstStyle/>
           <a:p>
-            <a:endParaRPr lang="en-US"/>
+            <a:r>
+              <a:rPr lang="en-US" sz="2400" dirty="0" smtClean="0"/>
+              <a:t>Starting at the rood node, then recursively select optimal children nodes until a leaf node is reached</a:t>
+            </a:r>
+          </a:p>
+          <a:p>
+            <a:r>
+              <a:rPr lang="en-US" sz="2400" dirty="0" smtClean="0"/>
+              <a:t>If the leaf node doesn’t end the game then create one or more children nodes and select one</a:t>
+            </a:r>
+          </a:p>
+          <a:p>
+            <a:r>
+              <a:rPr lang="en-US" sz="2400" dirty="0" smtClean="0"/>
+              <a:t>Run a simulated </a:t>
+            </a:r>
+            <a:r>
+              <a:rPr lang="en-US" sz="2400" dirty="0" err="1" smtClean="0"/>
+              <a:t>playout</a:t>
+            </a:r>
+            <a:r>
+              <a:rPr lang="en-US" sz="2400" dirty="0" smtClean="0"/>
+              <a:t> for this children node until a result is reached.</a:t>
+            </a:r>
+          </a:p>
+          <a:p>
+            <a:r>
+              <a:rPr lang="en-US" sz="2400" dirty="0" smtClean="0"/>
+              <a:t>Update the current move sequence with the simulated result</a:t>
+            </a:r>
+          </a:p>
+          <a:p>
+            <a:endParaRPr lang="en-US" dirty="0"/>
           </a:p>
         </p:txBody>
       </p:sp>

</xml_diff>

<commit_message>
ppt is also here
</commit_message>
<xml_diff>
--- a/project_ppt_lsd53_jdr289.pptx
+++ b/project_ppt_lsd53_jdr289.pptx
@@ -14,8 +14,9 @@
     <p:sldId id="265" r:id="rId8"/>
     <p:sldId id="261" r:id="rId9"/>
     <p:sldId id="262" r:id="rId10"/>
-    <p:sldId id="263" r:id="rId11"/>
-    <p:sldId id="266" r:id="rId12"/>
+    <p:sldId id="267" r:id="rId11"/>
+    <p:sldId id="263" r:id="rId12"/>
+    <p:sldId id="266" r:id="rId13"/>
   </p:sldIdLst>
   <p:sldSz cx="9144000" cy="6858000" type="screen4x3"/>
   <p:notesSz cx="6858000" cy="9144000"/>
@@ -3276,6 +3277,88 @@
         </p:nvSpPr>
         <p:spPr/>
         <p:txBody>
+          <a:bodyPr>
+            <a:normAutofit fontScale="90000"/>
+          </a:bodyPr>
+          <a:lstStyle/>
+          <a:p>
+            <a:r>
+              <a:rPr lang="en-US" dirty="0" smtClean="0"/>
+              <a:t>N Pure-Monte Carl </a:t>
+            </a:r>
+            <a:r>
+              <a:rPr lang="en-US" dirty="0" err="1" smtClean="0"/>
+              <a:t>vs</a:t>
+            </a:r>
+            <a:r>
+              <a:rPr lang="en-US" dirty="0" smtClean="0"/>
+              <a:t> M Pure-Monte Carlo</a:t>
+            </a:r>
+            <a:endParaRPr lang="en-US" dirty="0"/>
+          </a:p>
+        </p:txBody>
+      </p:sp>
+      <p:sp>
+        <p:nvSpPr>
+          <p:cNvPr id="3" name="Content Placeholder 2"/>
+          <p:cNvSpPr>
+            <a:spLocks noGrp="1"/>
+          </p:cNvSpPr>
+          <p:nvPr>
+            <p:ph idx="1"/>
+          </p:nvPr>
+        </p:nvSpPr>
+        <p:spPr/>
+        <p:txBody>
+          <a:bodyPr/>
+          <a:lstStyle/>
+          <a:p>
+            <a:endParaRPr lang="en-US"/>
+          </a:p>
+        </p:txBody>
+      </p:sp>
+    </p:spTree>
+    <p:extLst>
+      <p:ext uri="{BB962C8B-B14F-4D97-AF65-F5344CB8AC3E}">
+        <p14:creationId xmlns:p14="http://schemas.microsoft.com/office/powerpoint/2010/main" val="1888448215"/>
+      </p:ext>
+    </p:extLst>
+  </p:cSld>
+  <p:clrMapOvr>
+    <a:masterClrMapping/>
+  </p:clrMapOvr>
+</p:sld>
+</file>
+
+<file path=ppt/slides/slide11.xml><?xml version="1.0" encoding="utf-8"?>
+<p:sld xmlns:a="http://schemas.openxmlformats.org/drawingml/2006/main" xmlns:r="http://schemas.openxmlformats.org/officeDocument/2006/relationships" xmlns:p="http://schemas.openxmlformats.org/presentationml/2006/main">
+  <p:cSld>
+    <p:spTree>
+      <p:nvGrpSpPr>
+        <p:cNvPr id="1" name=""/>
+        <p:cNvGrpSpPr/>
+        <p:nvPr/>
+      </p:nvGrpSpPr>
+      <p:grpSpPr>
+        <a:xfrm>
+          <a:off x="0" y="0"/>
+          <a:ext cx="0" cy="0"/>
+          <a:chOff x="0" y="0"/>
+          <a:chExt cx="0" cy="0"/>
+        </a:xfrm>
+      </p:grpSpPr>
+      <p:sp>
+        <p:nvSpPr>
+          <p:cNvPr id="2" name="Title 1"/>
+          <p:cNvSpPr>
+            <a:spLocks noGrp="1"/>
+          </p:cNvSpPr>
+          <p:nvPr>
+            <p:ph type="title"/>
+          </p:nvPr>
+        </p:nvSpPr>
+        <p:spPr/>
+        <p:txBody>
           <a:bodyPr/>
           <a:lstStyle/>
           <a:p>
@@ -3327,7 +3410,7 @@
 </p:sld>
 </file>
 
-<file path=ppt/slides/slide11.xml><?xml version="1.0" encoding="utf-8"?>
+<file path=ppt/slides/slide12.xml><?xml version="1.0" encoding="utf-8"?>
 <p:sld xmlns:a="http://schemas.openxmlformats.org/drawingml/2006/main" xmlns:r="http://schemas.openxmlformats.org/officeDocument/2006/relationships" xmlns:p="http://schemas.openxmlformats.org/presentationml/2006/main">
   <p:cSld>
     <p:spTree>
@@ -3729,7 +3812,7 @@
           <a:p>
             <a:r>
               <a:rPr lang="en-US" sz="2400" dirty="0" smtClean="0"/>
-              <a:t>Starting at the rood node, then recursively select optimal children nodes until a leaf node is reached</a:t>
+              <a:t>Start at the root node, then recursively select optimal children nodes until a leaf node is reached</a:t>
             </a:r>
           </a:p>
           <a:p>
@@ -3954,36 +4037,26 @@
           <a:lstStyle/>
           <a:p>
             <a:r>
-              <a:rPr lang="en-US" sz="3200" dirty="0" smtClean="0"/>
+              <a:rPr lang="en-US" sz="4400" dirty="0" smtClean="0"/>
               <a:t>Win percentage </a:t>
             </a:r>
             <a:r>
-              <a:rPr lang="en-US" sz="3200" dirty="0" err="1" smtClean="0"/>
+              <a:rPr lang="en-US" sz="4400" dirty="0" err="1" smtClean="0"/>
               <a:t>vs</a:t>
             </a:r>
             <a:r>
-              <a:rPr lang="en-US" sz="3200" dirty="0" smtClean="0"/>
-              <a:t> humans</a:t>
-            </a:r>
-          </a:p>
-          <a:p>
-            <a:r>
-              <a:rPr lang="en-US" sz="3200" dirty="0" smtClean="0"/>
-              <a:t>Win percentage MCT </a:t>
-            </a:r>
-            <a:r>
-              <a:rPr lang="en-US" sz="3200" dirty="0" err="1" smtClean="0"/>
-              <a:t>vs</a:t>
-            </a:r>
-            <a:r>
-              <a:rPr lang="en-US" sz="3200" dirty="0" smtClean="0"/>
-              <a:t> Pure-Monte Carlo</a:t>
-            </a:r>
-          </a:p>
-          <a:p>
-            <a:r>
-              <a:rPr lang="en-US" sz="3200" dirty="0" smtClean="0"/>
-              <a:t>Number of turns to win</a:t>
+              <a:rPr lang="en-US" sz="4400" dirty="0" smtClean="0"/>
+              <a:t> opponent</a:t>
+            </a:r>
+          </a:p>
+          <a:p>
+            <a:r>
+              <a:rPr lang="en-US" sz="4400" smtClean="0"/>
+              <a:t>Average number </a:t>
+            </a:r>
+            <a:r>
+              <a:rPr lang="en-US" sz="4400" dirty="0" smtClean="0"/>
+              <a:t>of turns to win</a:t>
             </a:r>
           </a:p>
           <a:p>

</xml_diff>